<commit_message>
update slide note of powerpoint
</commit_message>
<xml_diff>
--- a/The analysis of Harry Potter dataset.pptx
+++ b/The analysis of Harry Potter dataset.pptx
@@ -256,7 +256,7 @@
           <a:p>
             <a:fld id="{C17F2C1D-F243-42AB-ADF2-E7CB4E04900E}" type="datetimeFigureOut">
               <a:rPr lang="en-US" smtClean="0"/>
-              <a:t>6/14/2022</a:t>
+              <a:t>6/15/2022</a:t>
             </a:fld>
             <a:endParaRPr lang="en-US"/>
           </a:p>
@@ -433,7 +433,7 @@
           <a:p>
             <a:fld id="{020CE34E-5667-4A32-A6BA-10C7A552BC63}" type="datetimeFigureOut">
               <a:rPr lang="en-US" smtClean="0"/>
-              <a:t>6/14/2022</a:t>
+              <a:t>6/15/2022</a:t>
             </a:fld>
             <a:endParaRPr lang="en-US"/>
           </a:p>
@@ -1004,6 +1004,130 @@
               <a:t>The year is adjacent to the movie name is the release year</a:t>
             </a:r>
           </a:p>
+          <a:p>
+            <a:pPr algn="l">
+              <a:buFont typeface="Arial" panose="020B0604020202020204" pitchFamily="34" charset="0"/>
+              <a:buNone/>
+            </a:pPr>
+            <a:endParaRPr lang="en-US" b="0" i="0" dirty="0">
+              <a:solidFill>
+                <a:srgbClr val="000000"/>
+              </a:solidFill>
+              <a:effectLst/>
+              <a:latin typeface="Times New Roman" panose="02020603050405020304" pitchFamily="18" charset="0"/>
+            </a:endParaRPr>
+          </a:p>
+          <a:p>
+            <a:pPr marL="0" marR="0" lvl="0" indent="0" algn="l" defTabSz="914400" rtl="0" eaLnBrk="1" fontAlgn="auto" latinLnBrk="0" hangingPunct="1">
+              <a:lnSpc>
+                <a:spcPct val="100000"/>
+              </a:lnSpc>
+              <a:spcBef>
+                <a:spcPts val="0"/>
+              </a:spcBef>
+              <a:spcAft>
+                <a:spcPts val="0"/>
+              </a:spcAft>
+              <a:buClrTx/>
+              <a:buSzTx/>
+              <a:buFont typeface="Arial" panose="020B0604020202020204" pitchFamily="34" charset="0"/>
+              <a:buNone/>
+              <a:tabLst/>
+              <a:defRPr/>
+            </a:pPr>
+            <a:r>
+              <a:rPr lang="en-US" b="1" i="0" dirty="0">
+                <a:solidFill>
+                  <a:srgbClr val="000000"/>
+                </a:solidFill>
+                <a:effectLst/>
+                <a:latin typeface="Times New Roman" panose="02020603050405020304" pitchFamily="18" charset="0"/>
+              </a:rPr>
+              <a:t>Source code</a:t>
+            </a:r>
+            <a:endParaRPr lang="en-US" b="0" i="0" dirty="0">
+              <a:solidFill>
+                <a:srgbClr val="000000"/>
+              </a:solidFill>
+              <a:effectLst/>
+              <a:latin typeface="Times New Roman" panose="02020603050405020304" pitchFamily="18" charset="0"/>
+            </a:endParaRPr>
+          </a:p>
+          <a:p>
+            <a:pPr marL="0" marR="0" lvl="0" indent="0" algn="l" defTabSz="914400" rtl="0" eaLnBrk="1" fontAlgn="auto" latinLnBrk="0" hangingPunct="1">
+              <a:lnSpc>
+                <a:spcPct val="100000"/>
+              </a:lnSpc>
+              <a:spcBef>
+                <a:spcPts val="0"/>
+              </a:spcBef>
+              <a:spcAft>
+                <a:spcPts val="0"/>
+              </a:spcAft>
+              <a:buClrTx/>
+              <a:buSzTx/>
+              <a:buFont typeface="Arial" panose="020B0604020202020204" pitchFamily="34" charset="0"/>
+              <a:buNone/>
+              <a:tabLst/>
+              <a:defRPr/>
+            </a:pPr>
+            <a:r>
+              <a:rPr lang="en-US" b="0" dirty="0">
+                <a:solidFill>
+                  <a:srgbClr val="CE9178"/>
+                </a:solidFill>
+                <a:effectLst/>
+                <a:latin typeface="Consolas" panose="020B0609020204030204" pitchFamily="49" charset="0"/>
+              </a:rPr>
+              <a:t>34d98515-2207-49ee-a3a0-4099330873be</a:t>
+            </a:r>
+            <a:r>
+              <a:rPr lang="en-US" b="0" i="0" dirty="0">
+                <a:solidFill>
+                  <a:srgbClr val="000000"/>
+                </a:solidFill>
+                <a:effectLst/>
+                <a:latin typeface="Times New Roman" panose="02020603050405020304" pitchFamily="18" charset="0"/>
+              </a:rPr>
+              <a:t>.html</a:t>
+            </a:r>
+          </a:p>
+          <a:p>
+            <a:pPr marL="0" marR="0" lvl="0" indent="0" algn="l" defTabSz="914400" rtl="0" eaLnBrk="1" fontAlgn="auto" latinLnBrk="0" hangingPunct="1">
+              <a:lnSpc>
+                <a:spcPct val="100000"/>
+              </a:lnSpc>
+              <a:spcBef>
+                <a:spcPts val="0"/>
+              </a:spcBef>
+              <a:spcAft>
+                <a:spcPts val="0"/>
+              </a:spcAft>
+              <a:buClrTx/>
+              <a:buSzTx/>
+              <a:buFont typeface="Arial" panose="020B0604020202020204" pitchFamily="34" charset="0"/>
+              <a:buNone/>
+              <a:tabLst/>
+              <a:defRPr/>
+            </a:pPr>
+            <a:r>
+              <a:rPr lang="en-US" b="0" i="0" dirty="0">
+                <a:solidFill>
+                  <a:srgbClr val="000000"/>
+                </a:solidFill>
+                <a:effectLst/>
+                <a:latin typeface="Times New Roman" panose="02020603050405020304" pitchFamily="18" charset="0"/>
+              </a:rPr>
+              <a:t>q2.ipynb</a:t>
+            </a:r>
+            <a:endParaRPr lang="en-US" b="0" dirty="0">
+              <a:solidFill>
+                <a:srgbClr val="D4D4D4"/>
+              </a:solidFill>
+              <a:effectLst/>
+              <a:latin typeface="Consolas" panose="020B0609020204030204" pitchFamily="49" charset="0"/>
+            </a:endParaRPr>
+          </a:p>
         </p:txBody>
       </p:sp>
       <p:sp>
@@ -1349,6 +1473,130 @@
               <a:t>The year is adjacent to the movie name is the release year</a:t>
             </a:r>
           </a:p>
+          <a:p>
+            <a:pPr algn="l">
+              <a:buFont typeface="Arial" panose="020B0604020202020204" pitchFamily="34" charset="0"/>
+              <a:buChar char="•"/>
+            </a:pPr>
+            <a:endParaRPr lang="en-US" b="0" i="0" dirty="0">
+              <a:solidFill>
+                <a:srgbClr val="000000"/>
+              </a:solidFill>
+              <a:effectLst/>
+              <a:latin typeface="Times New Roman" panose="02020603050405020304" pitchFamily="18" charset="0"/>
+            </a:endParaRPr>
+          </a:p>
+          <a:p>
+            <a:pPr marL="0" marR="0" lvl="0" indent="0" algn="l" defTabSz="914400" rtl="0" eaLnBrk="1" fontAlgn="auto" latinLnBrk="0" hangingPunct="1">
+              <a:lnSpc>
+                <a:spcPct val="100000"/>
+              </a:lnSpc>
+              <a:spcBef>
+                <a:spcPts val="0"/>
+              </a:spcBef>
+              <a:spcAft>
+                <a:spcPts val="0"/>
+              </a:spcAft>
+              <a:buClrTx/>
+              <a:buSzTx/>
+              <a:buFont typeface="Arial" panose="020B0604020202020204" pitchFamily="34" charset="0"/>
+              <a:buNone/>
+              <a:tabLst/>
+              <a:defRPr/>
+            </a:pPr>
+            <a:r>
+              <a:rPr lang="en-US" b="1" i="0" dirty="0">
+                <a:solidFill>
+                  <a:srgbClr val="000000"/>
+                </a:solidFill>
+                <a:effectLst/>
+                <a:latin typeface="Times New Roman" panose="02020603050405020304" pitchFamily="18" charset="0"/>
+              </a:rPr>
+              <a:t>Source code</a:t>
+            </a:r>
+            <a:endParaRPr lang="en-US" b="0" i="0" dirty="0">
+              <a:solidFill>
+                <a:srgbClr val="000000"/>
+              </a:solidFill>
+              <a:effectLst/>
+              <a:latin typeface="Times New Roman" panose="02020603050405020304" pitchFamily="18" charset="0"/>
+            </a:endParaRPr>
+          </a:p>
+          <a:p>
+            <a:pPr marL="0" marR="0" lvl="0" indent="0" algn="l" defTabSz="914400" rtl="0" eaLnBrk="1" fontAlgn="auto" latinLnBrk="0" hangingPunct="1">
+              <a:lnSpc>
+                <a:spcPct val="100000"/>
+              </a:lnSpc>
+              <a:spcBef>
+                <a:spcPts val="0"/>
+              </a:spcBef>
+              <a:spcAft>
+                <a:spcPts val="0"/>
+              </a:spcAft>
+              <a:buClrTx/>
+              <a:buSzTx/>
+              <a:buFont typeface="Arial" panose="020B0604020202020204" pitchFamily="34" charset="0"/>
+              <a:buNone/>
+              <a:tabLst/>
+              <a:defRPr/>
+            </a:pPr>
+            <a:r>
+              <a:rPr lang="en-US" b="0" dirty="0">
+                <a:solidFill>
+                  <a:srgbClr val="CE9178"/>
+                </a:solidFill>
+                <a:effectLst/>
+                <a:latin typeface="Consolas" panose="020B0609020204030204" pitchFamily="49" charset="0"/>
+              </a:rPr>
+              <a:t>e4340fd8-4c1d-4645-884f-5c14aecf902e</a:t>
+            </a:r>
+            <a:r>
+              <a:rPr lang="en-US" b="0" i="0" dirty="0">
+                <a:solidFill>
+                  <a:srgbClr val="000000"/>
+                </a:solidFill>
+                <a:effectLst/>
+                <a:latin typeface="Times New Roman" panose="02020603050405020304" pitchFamily="18" charset="0"/>
+              </a:rPr>
+              <a:t>.html</a:t>
+            </a:r>
+          </a:p>
+          <a:p>
+            <a:pPr marL="0" marR="0" lvl="0" indent="0" algn="l" defTabSz="914400" rtl="0" eaLnBrk="1" fontAlgn="auto" latinLnBrk="0" hangingPunct="1">
+              <a:lnSpc>
+                <a:spcPct val="100000"/>
+              </a:lnSpc>
+              <a:spcBef>
+                <a:spcPts val="0"/>
+              </a:spcBef>
+              <a:spcAft>
+                <a:spcPts val="0"/>
+              </a:spcAft>
+              <a:buClrTx/>
+              <a:buSzTx/>
+              <a:buFont typeface="Arial" panose="020B0604020202020204" pitchFamily="34" charset="0"/>
+              <a:buNone/>
+              <a:tabLst/>
+              <a:defRPr/>
+            </a:pPr>
+            <a:r>
+              <a:rPr lang="en-US" b="0" i="0" dirty="0">
+                <a:solidFill>
+                  <a:srgbClr val="000000"/>
+                </a:solidFill>
+                <a:effectLst/>
+                <a:latin typeface="Times New Roman" panose="02020603050405020304" pitchFamily="18" charset="0"/>
+              </a:rPr>
+              <a:t>q3.ipynb</a:t>
+            </a:r>
+            <a:endParaRPr lang="en-US" b="0" dirty="0">
+              <a:solidFill>
+                <a:srgbClr val="D4D4D4"/>
+              </a:solidFill>
+              <a:effectLst/>
+              <a:latin typeface="Consolas" panose="020B0609020204030204" pitchFamily="49" charset="0"/>
+            </a:endParaRPr>
+          </a:p>
         </p:txBody>
       </p:sp>
       <p:sp>
@@ -1694,6 +1942,130 @@
               <a:t>When hovering a bar, a text box will appear with the above data as well as the equivalent incantation</a:t>
             </a:r>
           </a:p>
+          <a:p>
+            <a:pPr algn="l">
+              <a:buFont typeface="Arial" panose="020B0604020202020204" pitchFamily="34" charset="0"/>
+              <a:buNone/>
+            </a:pPr>
+            <a:endParaRPr lang="en-US" b="0" i="0" dirty="0">
+              <a:solidFill>
+                <a:srgbClr val="000000"/>
+              </a:solidFill>
+              <a:effectLst/>
+              <a:latin typeface="Times New Roman" panose="02020603050405020304" pitchFamily="18" charset="0"/>
+            </a:endParaRPr>
+          </a:p>
+          <a:p>
+            <a:pPr marL="0" marR="0" lvl="0" indent="0" algn="l" defTabSz="914400" rtl="0" eaLnBrk="1" fontAlgn="auto" latinLnBrk="0" hangingPunct="1">
+              <a:lnSpc>
+                <a:spcPct val="100000"/>
+              </a:lnSpc>
+              <a:spcBef>
+                <a:spcPts val="0"/>
+              </a:spcBef>
+              <a:spcAft>
+                <a:spcPts val="0"/>
+              </a:spcAft>
+              <a:buClrTx/>
+              <a:buSzTx/>
+              <a:buFont typeface="Arial" panose="020B0604020202020204" pitchFamily="34" charset="0"/>
+              <a:buNone/>
+              <a:tabLst/>
+              <a:defRPr/>
+            </a:pPr>
+            <a:r>
+              <a:rPr lang="en-US" b="1" i="0" dirty="0">
+                <a:solidFill>
+                  <a:srgbClr val="000000"/>
+                </a:solidFill>
+                <a:effectLst/>
+                <a:latin typeface="Times New Roman" panose="02020603050405020304" pitchFamily="18" charset="0"/>
+              </a:rPr>
+              <a:t>Source code</a:t>
+            </a:r>
+            <a:endParaRPr lang="en-US" b="0" i="0" dirty="0">
+              <a:solidFill>
+                <a:srgbClr val="000000"/>
+              </a:solidFill>
+              <a:effectLst/>
+              <a:latin typeface="Times New Roman" panose="02020603050405020304" pitchFamily="18" charset="0"/>
+            </a:endParaRPr>
+          </a:p>
+          <a:p>
+            <a:pPr marL="0" marR="0" lvl="0" indent="0" algn="l" defTabSz="914400" rtl="0" eaLnBrk="1" fontAlgn="auto" latinLnBrk="0" hangingPunct="1">
+              <a:lnSpc>
+                <a:spcPct val="100000"/>
+              </a:lnSpc>
+              <a:spcBef>
+                <a:spcPts val="0"/>
+              </a:spcBef>
+              <a:spcAft>
+                <a:spcPts val="0"/>
+              </a:spcAft>
+              <a:buClrTx/>
+              <a:buSzTx/>
+              <a:buFont typeface="Arial" panose="020B0604020202020204" pitchFamily="34" charset="0"/>
+              <a:buNone/>
+              <a:tabLst/>
+              <a:defRPr/>
+            </a:pPr>
+            <a:r>
+              <a:rPr lang="en-US" b="0" dirty="0">
+                <a:solidFill>
+                  <a:srgbClr val="CE9178"/>
+                </a:solidFill>
+                <a:effectLst/>
+                <a:latin typeface="Consolas" panose="020B0609020204030204" pitchFamily="49" charset="0"/>
+              </a:rPr>
+              <a:t>5f817172-f1e7-4ca3-8b60-4a7e40c99239</a:t>
+            </a:r>
+            <a:r>
+              <a:rPr lang="en-US" b="0" i="0" dirty="0">
+                <a:solidFill>
+                  <a:srgbClr val="000000"/>
+                </a:solidFill>
+                <a:effectLst/>
+                <a:latin typeface="Times New Roman" panose="02020603050405020304" pitchFamily="18" charset="0"/>
+              </a:rPr>
+              <a:t>.html</a:t>
+            </a:r>
+          </a:p>
+          <a:p>
+            <a:pPr marL="0" marR="0" lvl="0" indent="0" algn="l" defTabSz="914400" rtl="0" eaLnBrk="1" fontAlgn="auto" latinLnBrk="0" hangingPunct="1">
+              <a:lnSpc>
+                <a:spcPct val="100000"/>
+              </a:lnSpc>
+              <a:spcBef>
+                <a:spcPts val="0"/>
+              </a:spcBef>
+              <a:spcAft>
+                <a:spcPts val="0"/>
+              </a:spcAft>
+              <a:buClrTx/>
+              <a:buSzTx/>
+              <a:buFont typeface="Arial" panose="020B0604020202020204" pitchFamily="34" charset="0"/>
+              <a:buNone/>
+              <a:tabLst/>
+              <a:defRPr/>
+            </a:pPr>
+            <a:r>
+              <a:rPr lang="en-US" b="0" i="0" dirty="0">
+                <a:solidFill>
+                  <a:srgbClr val="000000"/>
+                </a:solidFill>
+                <a:effectLst/>
+                <a:latin typeface="Times New Roman" panose="02020603050405020304" pitchFamily="18" charset="0"/>
+              </a:rPr>
+              <a:t>q4.ipynb</a:t>
+            </a:r>
+            <a:endParaRPr lang="en-US" b="0" dirty="0">
+              <a:solidFill>
+                <a:srgbClr val="D4D4D4"/>
+              </a:solidFill>
+              <a:effectLst/>
+              <a:latin typeface="Consolas" panose="020B0609020204030204" pitchFamily="49" charset="0"/>
+            </a:endParaRPr>
+          </a:p>
         </p:txBody>
       </p:sp>
       <p:sp>
@@ -2051,6 +2423,130 @@
               <a:t>How many times that each spell is used by the character by hovering your mouse into its equivalent sub-bar</a:t>
             </a:r>
           </a:p>
+          <a:p>
+            <a:pPr marL="742950" lvl="1" indent="-285750" algn="l">
+              <a:buFont typeface="Arial" panose="020B0604020202020204" pitchFamily="34" charset="0"/>
+              <a:buChar char="•"/>
+            </a:pPr>
+            <a:endParaRPr lang="en-US" b="0" i="0" dirty="0">
+              <a:solidFill>
+                <a:srgbClr val="000000"/>
+              </a:solidFill>
+              <a:effectLst/>
+              <a:latin typeface="Times New Roman" panose="02020603050405020304" pitchFamily="18" charset="0"/>
+            </a:endParaRPr>
+          </a:p>
+          <a:p>
+            <a:pPr marL="0" marR="0" lvl="0" indent="0" algn="l" defTabSz="914400" rtl="0" eaLnBrk="1" fontAlgn="auto" latinLnBrk="0" hangingPunct="1">
+              <a:lnSpc>
+                <a:spcPct val="100000"/>
+              </a:lnSpc>
+              <a:spcBef>
+                <a:spcPts val="0"/>
+              </a:spcBef>
+              <a:spcAft>
+                <a:spcPts val="0"/>
+              </a:spcAft>
+              <a:buClrTx/>
+              <a:buSzTx/>
+              <a:buFont typeface="Arial" panose="020B0604020202020204" pitchFamily="34" charset="0"/>
+              <a:buNone/>
+              <a:tabLst/>
+              <a:defRPr/>
+            </a:pPr>
+            <a:r>
+              <a:rPr lang="en-US" b="1" i="0" dirty="0">
+                <a:solidFill>
+                  <a:srgbClr val="000000"/>
+                </a:solidFill>
+                <a:effectLst/>
+                <a:latin typeface="Times New Roman" panose="02020603050405020304" pitchFamily="18" charset="0"/>
+              </a:rPr>
+              <a:t>Source code</a:t>
+            </a:r>
+            <a:endParaRPr lang="en-US" b="0" i="0" dirty="0">
+              <a:solidFill>
+                <a:srgbClr val="000000"/>
+              </a:solidFill>
+              <a:effectLst/>
+              <a:latin typeface="Times New Roman" panose="02020603050405020304" pitchFamily="18" charset="0"/>
+            </a:endParaRPr>
+          </a:p>
+          <a:p>
+            <a:pPr marL="0" marR="0" lvl="0" indent="0" algn="l" defTabSz="914400" rtl="0" eaLnBrk="1" fontAlgn="auto" latinLnBrk="0" hangingPunct="1">
+              <a:lnSpc>
+                <a:spcPct val="100000"/>
+              </a:lnSpc>
+              <a:spcBef>
+                <a:spcPts val="0"/>
+              </a:spcBef>
+              <a:spcAft>
+                <a:spcPts val="0"/>
+              </a:spcAft>
+              <a:buClrTx/>
+              <a:buSzTx/>
+              <a:buFont typeface="Arial" panose="020B0604020202020204" pitchFamily="34" charset="0"/>
+              <a:buNone/>
+              <a:tabLst/>
+              <a:defRPr/>
+            </a:pPr>
+            <a:r>
+              <a:rPr lang="en-US" b="0" dirty="0">
+                <a:solidFill>
+                  <a:srgbClr val="CE9178"/>
+                </a:solidFill>
+                <a:effectLst/>
+                <a:latin typeface="Consolas" panose="020B0609020204030204" pitchFamily="49" charset="0"/>
+              </a:rPr>
+              <a:t>c8842f18-45aa-4d0f-a596-a9be6de37705</a:t>
+            </a:r>
+            <a:r>
+              <a:rPr lang="en-US" b="0" i="0" dirty="0">
+                <a:solidFill>
+                  <a:srgbClr val="000000"/>
+                </a:solidFill>
+                <a:effectLst/>
+                <a:latin typeface="Times New Roman" panose="02020603050405020304" pitchFamily="18" charset="0"/>
+              </a:rPr>
+              <a:t>.html</a:t>
+            </a:r>
+          </a:p>
+          <a:p>
+            <a:pPr marL="0" marR="0" lvl="0" indent="0" algn="l" defTabSz="914400" rtl="0" eaLnBrk="1" fontAlgn="auto" latinLnBrk="0" hangingPunct="1">
+              <a:lnSpc>
+                <a:spcPct val="100000"/>
+              </a:lnSpc>
+              <a:spcBef>
+                <a:spcPts val="0"/>
+              </a:spcBef>
+              <a:spcAft>
+                <a:spcPts val="0"/>
+              </a:spcAft>
+              <a:buClrTx/>
+              <a:buSzTx/>
+              <a:buFont typeface="Arial" panose="020B0604020202020204" pitchFamily="34" charset="0"/>
+              <a:buNone/>
+              <a:tabLst/>
+              <a:defRPr/>
+            </a:pPr>
+            <a:r>
+              <a:rPr lang="en-US" b="0" i="0" dirty="0">
+                <a:solidFill>
+                  <a:srgbClr val="000000"/>
+                </a:solidFill>
+                <a:effectLst/>
+                <a:latin typeface="Times New Roman" panose="02020603050405020304" pitchFamily="18" charset="0"/>
+              </a:rPr>
+              <a:t>q4.ipynb</a:t>
+            </a:r>
+            <a:endParaRPr lang="en-US" b="0" dirty="0">
+              <a:solidFill>
+                <a:srgbClr val="D4D4D4"/>
+              </a:solidFill>
+              <a:effectLst/>
+              <a:latin typeface="Consolas" panose="020B0609020204030204" pitchFamily="49" charset="0"/>
+            </a:endParaRPr>
+          </a:p>
         </p:txBody>
       </p:sp>
       <p:sp>
@@ -2719,6 +3215,117 @@
               <a:t>The year is adjacent to the movie name is the release year</a:t>
             </a:r>
           </a:p>
+          <a:p>
+            <a:pPr algn="l">
+              <a:buFont typeface="Arial" panose="020B0604020202020204" pitchFamily="34" charset="0"/>
+              <a:buNone/>
+            </a:pPr>
+            <a:endParaRPr lang="en-US" b="0" i="0" dirty="0">
+              <a:solidFill>
+                <a:srgbClr val="000000"/>
+              </a:solidFill>
+              <a:effectLst/>
+              <a:latin typeface="Times New Roman" panose="02020603050405020304" pitchFamily="18" charset="0"/>
+            </a:endParaRPr>
+          </a:p>
+          <a:p>
+            <a:pPr algn="l">
+              <a:buFont typeface="Arial" panose="020B0604020202020204" pitchFamily="34" charset="0"/>
+              <a:buNone/>
+            </a:pPr>
+            <a:r>
+              <a:rPr lang="en-US" b="1" i="0" dirty="0">
+                <a:solidFill>
+                  <a:srgbClr val="000000"/>
+                </a:solidFill>
+                <a:effectLst/>
+                <a:latin typeface="Times New Roman" panose="02020603050405020304" pitchFamily="18" charset="0"/>
+              </a:rPr>
+              <a:t>Source code</a:t>
+            </a:r>
+            <a:endParaRPr lang="en-US" b="0" i="0" dirty="0">
+              <a:solidFill>
+                <a:srgbClr val="000000"/>
+              </a:solidFill>
+              <a:effectLst/>
+              <a:latin typeface="Times New Roman" panose="02020603050405020304" pitchFamily="18" charset="0"/>
+            </a:endParaRPr>
+          </a:p>
+          <a:p>
+            <a:pPr marL="0" marR="0" lvl="0" indent="0" algn="l" defTabSz="914400" rtl="0" eaLnBrk="1" fontAlgn="auto" latinLnBrk="0" hangingPunct="1">
+              <a:lnSpc>
+                <a:spcPct val="100000"/>
+              </a:lnSpc>
+              <a:spcBef>
+                <a:spcPts val="0"/>
+              </a:spcBef>
+              <a:spcAft>
+                <a:spcPts val="0"/>
+              </a:spcAft>
+              <a:buClrTx/>
+              <a:buSzTx/>
+              <a:buFont typeface="Arial" panose="020B0604020202020204" pitchFamily="34" charset="0"/>
+              <a:buNone/>
+              <a:tabLst/>
+              <a:defRPr/>
+            </a:pPr>
+            <a:r>
+              <a:rPr lang="en-US" b="0" dirty="0">
+                <a:solidFill>
+                  <a:srgbClr val="CE9178"/>
+                </a:solidFill>
+                <a:effectLst/>
+                <a:latin typeface="Consolas" panose="020B0609020204030204" pitchFamily="49" charset="0"/>
+              </a:rPr>
+              <a:t>7b3394ed-007d-4cf1-a111-b197459199bb</a:t>
+            </a:r>
+            <a:r>
+              <a:rPr lang="en-US" b="0" i="0" dirty="0">
+                <a:solidFill>
+                  <a:srgbClr val="000000"/>
+                </a:solidFill>
+                <a:effectLst/>
+                <a:latin typeface="Times New Roman" panose="02020603050405020304" pitchFamily="18" charset="0"/>
+              </a:rPr>
+              <a:t>.html</a:t>
+            </a:r>
+          </a:p>
+          <a:p>
+            <a:pPr marL="0" marR="0" lvl="0" indent="0" algn="l" defTabSz="914400" rtl="0" eaLnBrk="1" fontAlgn="auto" latinLnBrk="0" hangingPunct="1">
+              <a:lnSpc>
+                <a:spcPct val="100000"/>
+              </a:lnSpc>
+              <a:spcBef>
+                <a:spcPts val="0"/>
+              </a:spcBef>
+              <a:spcAft>
+                <a:spcPts val="0"/>
+              </a:spcAft>
+              <a:buClrTx/>
+              <a:buSzTx/>
+              <a:buFont typeface="Arial" panose="020B0604020202020204" pitchFamily="34" charset="0"/>
+              <a:buNone/>
+              <a:tabLst/>
+              <a:defRPr/>
+            </a:pPr>
+            <a:r>
+              <a:rPr lang="en-US" b="0" i="0" dirty="0">
+                <a:solidFill>
+                  <a:srgbClr val="000000"/>
+                </a:solidFill>
+                <a:effectLst/>
+                <a:latin typeface="Times New Roman" panose="02020603050405020304" pitchFamily="18" charset="0"/>
+              </a:rPr>
+              <a:t>q1.ipynb</a:t>
+            </a:r>
+            <a:endParaRPr lang="en-US" b="0" dirty="0">
+              <a:solidFill>
+                <a:srgbClr val="D4D4D4"/>
+              </a:solidFill>
+              <a:effectLst/>
+              <a:latin typeface="Consolas" panose="020B0609020204030204" pitchFamily="49" charset="0"/>
+            </a:endParaRPr>
+          </a:p>
         </p:txBody>
       </p:sp>
       <p:sp>
@@ -3115,6 +3722,130 @@
               </a:rPr>
               <a:t>The y-axis will be the character name</a:t>
             </a:r>
+          </a:p>
+          <a:p>
+            <a:pPr marL="0" lvl="0" indent="0" algn="l">
+              <a:buFont typeface="Arial" panose="020B0604020202020204" pitchFamily="34" charset="0"/>
+              <a:buNone/>
+            </a:pPr>
+            <a:endParaRPr lang="en-US" b="0" i="0" dirty="0">
+              <a:solidFill>
+                <a:srgbClr val="000000"/>
+              </a:solidFill>
+              <a:effectLst/>
+              <a:latin typeface="Times New Roman" panose="02020603050405020304" pitchFamily="18" charset="0"/>
+            </a:endParaRPr>
+          </a:p>
+          <a:p>
+            <a:pPr marL="0" marR="0" lvl="0" indent="0" algn="l" defTabSz="914400" rtl="0" eaLnBrk="1" fontAlgn="auto" latinLnBrk="0" hangingPunct="1">
+              <a:lnSpc>
+                <a:spcPct val="100000"/>
+              </a:lnSpc>
+              <a:spcBef>
+                <a:spcPts val="0"/>
+              </a:spcBef>
+              <a:spcAft>
+                <a:spcPts val="0"/>
+              </a:spcAft>
+              <a:buClrTx/>
+              <a:buSzTx/>
+              <a:buFont typeface="Arial" panose="020B0604020202020204" pitchFamily="34" charset="0"/>
+              <a:buNone/>
+              <a:tabLst/>
+              <a:defRPr/>
+            </a:pPr>
+            <a:r>
+              <a:rPr lang="en-US" b="1" i="0" dirty="0">
+                <a:solidFill>
+                  <a:srgbClr val="000000"/>
+                </a:solidFill>
+                <a:effectLst/>
+                <a:latin typeface="Times New Roman" panose="02020603050405020304" pitchFamily="18" charset="0"/>
+              </a:rPr>
+              <a:t>Source code</a:t>
+            </a:r>
+            <a:endParaRPr lang="en-US" b="0" i="0" dirty="0">
+              <a:solidFill>
+                <a:srgbClr val="000000"/>
+              </a:solidFill>
+              <a:effectLst/>
+              <a:latin typeface="Times New Roman" panose="02020603050405020304" pitchFamily="18" charset="0"/>
+            </a:endParaRPr>
+          </a:p>
+          <a:p>
+            <a:pPr marL="0" marR="0" lvl="0" indent="0" algn="l" defTabSz="914400" rtl="0" eaLnBrk="1" fontAlgn="auto" latinLnBrk="0" hangingPunct="1">
+              <a:lnSpc>
+                <a:spcPct val="100000"/>
+              </a:lnSpc>
+              <a:spcBef>
+                <a:spcPts val="0"/>
+              </a:spcBef>
+              <a:spcAft>
+                <a:spcPts val="0"/>
+              </a:spcAft>
+              <a:buClrTx/>
+              <a:buSzTx/>
+              <a:buFont typeface="Arial" panose="020B0604020202020204" pitchFamily="34" charset="0"/>
+              <a:buNone/>
+              <a:tabLst/>
+              <a:defRPr/>
+            </a:pPr>
+            <a:r>
+              <a:rPr lang="en-US" b="0" dirty="0">
+                <a:solidFill>
+                  <a:srgbClr val="CE9178"/>
+                </a:solidFill>
+                <a:effectLst/>
+                <a:latin typeface="Consolas" panose="020B0609020204030204" pitchFamily="49" charset="0"/>
+              </a:rPr>
+              <a:t>fe10a966-2650-4eb2-a5af-6b3151c5cff9</a:t>
+            </a:r>
+            <a:r>
+              <a:rPr lang="en-US" b="0" i="0" dirty="0">
+                <a:solidFill>
+                  <a:srgbClr val="000000"/>
+                </a:solidFill>
+                <a:effectLst/>
+                <a:latin typeface="Times New Roman" panose="02020603050405020304" pitchFamily="18" charset="0"/>
+              </a:rPr>
+              <a:t>.html</a:t>
+            </a:r>
+          </a:p>
+          <a:p>
+            <a:pPr marL="0" marR="0" lvl="0" indent="0" algn="l" defTabSz="914400" rtl="0" eaLnBrk="1" fontAlgn="auto" latinLnBrk="0" hangingPunct="1">
+              <a:lnSpc>
+                <a:spcPct val="100000"/>
+              </a:lnSpc>
+              <a:spcBef>
+                <a:spcPts val="0"/>
+              </a:spcBef>
+              <a:spcAft>
+                <a:spcPts val="0"/>
+              </a:spcAft>
+              <a:buClrTx/>
+              <a:buSzTx/>
+              <a:buFont typeface="Arial" panose="020B0604020202020204" pitchFamily="34" charset="0"/>
+              <a:buNone/>
+              <a:tabLst/>
+              <a:defRPr/>
+            </a:pPr>
+            <a:r>
+              <a:rPr lang="en-US" b="0" i="0" dirty="0">
+                <a:solidFill>
+                  <a:srgbClr val="000000"/>
+                </a:solidFill>
+                <a:effectLst/>
+                <a:latin typeface="Times New Roman" panose="02020603050405020304" pitchFamily="18" charset="0"/>
+              </a:rPr>
+              <a:t>q2.ipynb</a:t>
+            </a:r>
+            <a:endParaRPr lang="en-US" b="0" dirty="0">
+              <a:solidFill>
+                <a:srgbClr val="D4D4D4"/>
+              </a:solidFill>
+              <a:effectLst/>
+              <a:latin typeface="Consolas" panose="020B0609020204030204" pitchFamily="49" charset="0"/>
+            </a:endParaRPr>
           </a:p>
         </p:txBody>
       </p:sp>
@@ -28448,34 +29179,6 @@
 </file>
 
 <file path=customXml/item1.xml><?xml version="1.0" encoding="utf-8"?>
-<p:properties xmlns:p="http://schemas.microsoft.com/office/2006/metadata/properties" xmlns:xsi="http://www.w3.org/2001/XMLSchema-instance" xmlns:pc="http://schemas.microsoft.com/office/infopath/2007/PartnerControls">
-  <documentManagement>
-    <_ip_UnifiedCompliancePolicyUIAction xmlns="http://schemas.microsoft.com/sharepoint/v3" xsi:nil="true"/>
-    <Image xmlns="71af3243-3dd4-4a8d-8c0d-dd76da1f02a5">
-      <Url xsi:nil="true"/>
-      <Description xsi:nil="true"/>
-    </Image>
-    <Status xmlns="71af3243-3dd4-4a8d-8c0d-dd76da1f02a5">Not started</Status>
-    <_ip_UnifiedCompliancePolicyProperties xmlns="http://schemas.microsoft.com/sharepoint/v3" xsi:nil="true"/>
-    <lcf76f155ced4ddcb4097134ff3c332f xmlns="71af3243-3dd4-4a8d-8c0d-dd76da1f02a5">
-      <Terms xmlns="http://schemas.microsoft.com/office/infopath/2007/PartnerControls"/>
-    </lcf76f155ced4ddcb4097134ff3c332f>
-    <TaxCatchAll xmlns="230e9df3-be65-4c73-a93b-d1236ebd677e"/>
-    <MediaServiceKeyPoints xmlns="71af3243-3dd4-4a8d-8c0d-dd76da1f02a5" xsi:nil="true"/>
-  </documentManagement>
-</p:properties>
-</file>
-
-<file path=customXml/item2.xml><?xml version="1.0" encoding="utf-8"?>
-<?mso-contentType ?>
-<FormTemplates xmlns="http://schemas.microsoft.com/sharepoint/v3/contenttype/forms">
-  <Display>DocumentLibraryForm</Display>
-  <Edit>DocumentLibraryForm</Edit>
-  <New>DocumentLibraryForm</New>
-</FormTemplates>
-</file>
-
-<file path=customXml/item3.xml><?xml version="1.0" encoding="utf-8"?>
 <ct:contentTypeSchema xmlns:ct="http://schemas.microsoft.com/office/2006/metadata/contentType" xmlns:ma="http://schemas.microsoft.com/office/2006/metadata/properties/metaAttributes" ct:_="" ma:_="" ma:contentTypeName="Document" ma:contentTypeID="0x01010079F111ED35F8CC479449609E8A0923A6" ma:contentTypeVersion="18" ma:contentTypeDescription="Create a new document." ma:contentTypeScope="" ma:versionID="22a266b9fa9a230c5a512669d8b298c3">
   <xsd:schema xmlns:xsd="http://www.w3.org/2001/XMLSchema" xmlns:xs="http://www.w3.org/2001/XMLSchema" xmlns:p="http://schemas.microsoft.com/office/2006/metadata/properties" xmlns:ns1="http://schemas.microsoft.com/sharepoint/v3" xmlns:ns2="71af3243-3dd4-4a8d-8c0d-dd76da1f02a5" xmlns:ns3="16c05727-aa75-4e4a-9b5f-8a80a1165891" xmlns:ns4="230e9df3-be65-4c73-a93b-d1236ebd677e" targetNamespace="http://schemas.microsoft.com/office/2006/metadata/properties" ma:root="true" ma:fieldsID="eddc33fff6b14141ee5c74a0d29ea6a1" ns1:_="" ns2:_="" ns3:_="" ns4:_="">
     <xsd:import namespace="http://schemas.microsoft.com/sharepoint/v3"/>
@@ -28751,27 +29454,35 @@
 </ct:contentTypeSchema>
 </file>
 
-<file path=customXml/itemProps1.xml><?xml version="1.0" encoding="utf-8"?>
-<ds:datastoreItem xmlns:ds="http://schemas.openxmlformats.org/officeDocument/2006/customXml" ds:itemID="{50811A92-D464-4AC4-A396-BA73B10CEEAC}">
-  <ds:schemaRefs>
-    <ds:schemaRef ds:uri="http://schemas.microsoft.com/office/2006/metadata/properties"/>
-    <ds:schemaRef ds:uri="http://schemas.microsoft.com/office/infopath/2007/PartnerControls"/>
-    <ds:schemaRef ds:uri="http://schemas.microsoft.com/sharepoint/v3"/>
-    <ds:schemaRef ds:uri="71af3243-3dd4-4a8d-8c0d-dd76da1f02a5"/>
-    <ds:schemaRef ds:uri="230e9df3-be65-4c73-a93b-d1236ebd677e"/>
-  </ds:schemaRefs>
-</ds:datastoreItem>
+<file path=customXml/item2.xml><?xml version="1.0" encoding="utf-8"?>
+<?mso-contentType ?>
+<FormTemplates xmlns="http://schemas.microsoft.com/sharepoint/v3/contenttype/forms">
+  <Display>DocumentLibraryForm</Display>
+  <Edit>DocumentLibraryForm</Edit>
+  <New>DocumentLibraryForm</New>
+</FormTemplates>
 </file>
 
-<file path=customXml/itemProps2.xml><?xml version="1.0" encoding="utf-8"?>
-<ds:datastoreItem xmlns:ds="http://schemas.openxmlformats.org/officeDocument/2006/customXml" ds:itemID="{904751AB-E840-446F-8D49-E697067EC887}">
-  <ds:schemaRefs>
-    <ds:schemaRef ds:uri="http://schemas.microsoft.com/sharepoint/v3/contenttype/forms"/>
-  </ds:schemaRefs>
-</ds:datastoreItem>
+<file path=customXml/item3.xml><?xml version="1.0" encoding="utf-8"?>
+<p:properties xmlns:p="http://schemas.microsoft.com/office/2006/metadata/properties" xmlns:xsi="http://www.w3.org/2001/XMLSchema-instance" xmlns:pc="http://schemas.microsoft.com/office/infopath/2007/PartnerControls">
+  <documentManagement>
+    <_ip_UnifiedCompliancePolicyUIAction xmlns="http://schemas.microsoft.com/sharepoint/v3" xsi:nil="true"/>
+    <Image xmlns="71af3243-3dd4-4a8d-8c0d-dd76da1f02a5">
+      <Url xsi:nil="true"/>
+      <Description xsi:nil="true"/>
+    </Image>
+    <Status xmlns="71af3243-3dd4-4a8d-8c0d-dd76da1f02a5">Not started</Status>
+    <_ip_UnifiedCompliancePolicyProperties xmlns="http://schemas.microsoft.com/sharepoint/v3" xsi:nil="true"/>
+    <lcf76f155ced4ddcb4097134ff3c332f xmlns="71af3243-3dd4-4a8d-8c0d-dd76da1f02a5">
+      <Terms xmlns="http://schemas.microsoft.com/office/infopath/2007/PartnerControls"/>
+    </lcf76f155ced4ddcb4097134ff3c332f>
+    <TaxCatchAll xmlns="230e9df3-be65-4c73-a93b-d1236ebd677e"/>
+    <MediaServiceKeyPoints xmlns="71af3243-3dd4-4a8d-8c0d-dd76da1f02a5" xsi:nil="true"/>
+  </documentManagement>
+</p:properties>
 </file>
 
-<file path=customXml/itemProps3.xml><?xml version="1.0" encoding="utf-8"?>
+<file path=customXml/itemProps1.xml><?xml version="1.0" encoding="utf-8"?>
 <ds:datastoreItem xmlns:ds="http://schemas.openxmlformats.org/officeDocument/2006/customXml" ds:itemID="{DE4876F9-7AE1-498D-B8FE-1E3AD703D2AF}">
   <ds:schemaRefs>
     <ds:schemaRef ds:uri="http://schemas.microsoft.com/office/2006/metadata/contentType"/>
@@ -28792,6 +29503,26 @@
 </ds:datastoreItem>
 </file>
 
+<file path=customXml/itemProps2.xml><?xml version="1.0" encoding="utf-8"?>
+<ds:datastoreItem xmlns:ds="http://schemas.openxmlformats.org/officeDocument/2006/customXml" ds:itemID="{904751AB-E840-446F-8D49-E697067EC887}">
+  <ds:schemaRefs>
+    <ds:schemaRef ds:uri="http://schemas.microsoft.com/sharepoint/v3/contenttype/forms"/>
+  </ds:schemaRefs>
+</ds:datastoreItem>
+</file>
+
+<file path=customXml/itemProps3.xml><?xml version="1.0" encoding="utf-8"?>
+<ds:datastoreItem xmlns:ds="http://schemas.openxmlformats.org/officeDocument/2006/customXml" ds:itemID="{50811A92-D464-4AC4-A396-BA73B10CEEAC}">
+  <ds:schemaRefs>
+    <ds:schemaRef ds:uri="http://schemas.microsoft.com/office/2006/metadata/properties"/>
+    <ds:schemaRef ds:uri="http://schemas.microsoft.com/office/infopath/2007/PartnerControls"/>
+    <ds:schemaRef ds:uri="http://schemas.microsoft.com/sharepoint/v3"/>
+    <ds:schemaRef ds:uri="71af3243-3dd4-4a8d-8c0d-dd76da1f02a5"/>
+    <ds:schemaRef ds:uri="230e9df3-be65-4c73-a93b-d1236ebd677e"/>
+  </ds:schemaRefs>
+</ds:datastoreItem>
+</file>
+
 <file path=docMetadata/LabelInfo.xml><?xml version="1.0" encoding="utf-8"?>
 <clbl:labelList xmlns:clbl="http://schemas.microsoft.com/office/2020/mipLabelMetadata">
   <clbl:label id="{f42aa342-8706-4288-bd11-ebb85995028c}" enabled="1" method="Standard" siteId="{72f988bf-86f1-41af-91ab-2d7cd011db47}" contentBits="0" removed="0"/>

</xml_diff>